<commit_message>
Labelled the Y axis on the bar chart example
</commit_message>
<xml_diff>
--- a/Slides/D3.pptx
+++ b/Slides/D3.pptx
@@ -5,7 +5,7 @@
     <p:sldMasterId id="2147483660" r:id="rId1"/>
   </p:sldMasterIdLst>
   <p:notesMasterIdLst>
-    <p:notesMasterId r:id="rId15"/>
+    <p:notesMasterId r:id="rId19"/>
   </p:notesMasterIdLst>
   <p:sldIdLst>
     <p:sldId id="256" r:id="rId2"/>
@@ -21,6 +21,10 @@
     <p:sldId id="266" r:id="rId12"/>
     <p:sldId id="267" r:id="rId13"/>
     <p:sldId id="268" r:id="rId14"/>
+    <p:sldId id="269" r:id="rId15"/>
+    <p:sldId id="270" r:id="rId16"/>
+    <p:sldId id="271" r:id="rId17"/>
+    <p:sldId id="272" r:id="rId18"/>
   </p:sldIdLst>
   <p:sldSz cx="12192000" cy="6858000"/>
   <p:notesSz cx="6858000" cy="9144000"/>
@@ -119,6 +123,11 @@
       </a:defRPr>
     </a:lvl9pPr>
   </p:defaultTextStyle>
+  <p:extLst>
+    <p:ext uri="{EFAFB233-063F-42B5-8137-9DF3F51BA10A}">
+      <p15:sldGuideLst xmlns:p15="http://schemas.microsoft.com/office/powerpoint/2012/main"/>
+    </p:ext>
+  </p:extLst>
 </p:presentation>
 </file>
 
@@ -204,7 +213,7 @@
           <a:p>
             <a:fld id="{F2FD5E34-5871-4249-913E-D69CD2F5B120}" type="datetimeFigureOut">
               <a:rPr lang="en-US" smtClean="0"/>
-              <a:t>3/22/2014</a:t>
+              <a:t>3/25/2014</a:t>
             </a:fld>
             <a:endParaRPr lang="en-US"/>
           </a:p>
@@ -1085,6 +1094,376 @@
 </p:notes>
 </file>
 
+<file path=ppt/notesSlides/notesSlide12.xml><?xml version="1.0" encoding="utf-8"?>
+<p:notes xmlns:a="http://schemas.openxmlformats.org/drawingml/2006/main" xmlns:r="http://schemas.openxmlformats.org/officeDocument/2006/relationships" xmlns:p="http://schemas.openxmlformats.org/presentationml/2006/main">
+  <p:cSld>
+    <p:spTree>
+      <p:nvGrpSpPr>
+        <p:cNvPr id="1" name=""/>
+        <p:cNvGrpSpPr/>
+        <p:nvPr/>
+      </p:nvGrpSpPr>
+      <p:grpSpPr>
+        <a:xfrm>
+          <a:off x="0" y="0"/>
+          <a:ext cx="0" cy="0"/>
+          <a:chOff x="0" y="0"/>
+          <a:chExt cx="0" cy="0"/>
+        </a:xfrm>
+      </p:grpSpPr>
+      <p:sp>
+        <p:nvSpPr>
+          <p:cNvPr id="2" name="Slide Image Placeholder 1"/>
+          <p:cNvSpPr>
+            <a:spLocks noGrp="1" noRot="1" noChangeAspect="1"/>
+          </p:cNvSpPr>
+          <p:nvPr>
+            <p:ph type="sldImg"/>
+          </p:nvPr>
+        </p:nvSpPr>
+        <p:spPr/>
+      </p:sp>
+      <p:sp>
+        <p:nvSpPr>
+          <p:cNvPr id="3" name="Notes Placeholder 2"/>
+          <p:cNvSpPr>
+            <a:spLocks noGrp="1"/>
+          </p:cNvSpPr>
+          <p:nvPr>
+            <p:ph type="body" idx="1"/>
+          </p:nvPr>
+        </p:nvSpPr>
+        <p:spPr/>
+        <p:txBody>
+          <a:bodyPr/>
+          <a:lstStyle/>
+          <a:p>
+            <a:r>
+              <a:rPr lang="en-US" dirty="0" smtClean="0"/>
+              <a:t>Show</a:t>
+            </a:r>
+            <a:r>
+              <a:rPr lang="en-US" baseline="0" dirty="0" smtClean="0"/>
+              <a:t> basic updating</a:t>
+            </a:r>
+          </a:p>
+        </p:txBody>
+      </p:sp>
+      <p:sp>
+        <p:nvSpPr>
+          <p:cNvPr id="4" name="Slide Number Placeholder 3"/>
+          <p:cNvSpPr>
+            <a:spLocks noGrp="1"/>
+          </p:cNvSpPr>
+          <p:nvPr>
+            <p:ph type="sldNum" sz="quarter" idx="10"/>
+          </p:nvPr>
+        </p:nvSpPr>
+        <p:spPr/>
+        <p:txBody>
+          <a:bodyPr/>
+          <a:lstStyle/>
+          <a:p>
+            <a:fld id="{2CA6A022-9899-462F-AF11-091E7F58E280}" type="slidenum">
+              <a:rPr lang="en-US" smtClean="0"/>
+              <a:t>14</a:t>
+            </a:fld>
+            <a:endParaRPr lang="en-US"/>
+          </a:p>
+        </p:txBody>
+      </p:sp>
+    </p:spTree>
+    <p:extLst>
+      <p:ext uri="{BB962C8B-B14F-4D97-AF65-F5344CB8AC3E}">
+        <p14:creationId xmlns:p14="http://schemas.microsoft.com/office/powerpoint/2010/main" val="773276683"/>
+      </p:ext>
+    </p:extLst>
+  </p:cSld>
+  <p:clrMapOvr>
+    <a:masterClrMapping/>
+  </p:clrMapOvr>
+</p:notes>
+</file>
+
+<file path=ppt/notesSlides/notesSlide13.xml><?xml version="1.0" encoding="utf-8"?>
+<p:notes xmlns:a="http://schemas.openxmlformats.org/drawingml/2006/main" xmlns:r="http://schemas.openxmlformats.org/officeDocument/2006/relationships" xmlns:p="http://schemas.openxmlformats.org/presentationml/2006/main">
+  <p:cSld>
+    <p:spTree>
+      <p:nvGrpSpPr>
+        <p:cNvPr id="1" name=""/>
+        <p:cNvGrpSpPr/>
+        <p:nvPr/>
+      </p:nvGrpSpPr>
+      <p:grpSpPr>
+        <a:xfrm>
+          <a:off x="0" y="0"/>
+          <a:ext cx="0" cy="0"/>
+          <a:chOff x="0" y="0"/>
+          <a:chExt cx="0" cy="0"/>
+        </a:xfrm>
+      </p:grpSpPr>
+      <p:sp>
+        <p:nvSpPr>
+          <p:cNvPr id="2" name="Slide Image Placeholder 1"/>
+          <p:cNvSpPr>
+            <a:spLocks noGrp="1" noRot="1" noChangeAspect="1"/>
+          </p:cNvSpPr>
+          <p:nvPr>
+            <p:ph type="sldImg"/>
+          </p:nvPr>
+        </p:nvSpPr>
+        <p:spPr/>
+      </p:sp>
+      <p:sp>
+        <p:nvSpPr>
+          <p:cNvPr id="3" name="Notes Placeholder 2"/>
+          <p:cNvSpPr>
+            <a:spLocks noGrp="1"/>
+          </p:cNvSpPr>
+          <p:nvPr>
+            <p:ph type="body" idx="1"/>
+          </p:nvPr>
+        </p:nvSpPr>
+        <p:spPr/>
+        <p:txBody>
+          <a:bodyPr/>
+          <a:lstStyle/>
+          <a:p>
+            <a:r>
+              <a:rPr lang="en-US" dirty="0" err="1" smtClean="0"/>
+              <a:t>Todo</a:t>
+            </a:r>
+            <a:endParaRPr lang="en-US" dirty="0" smtClean="0"/>
+          </a:p>
+          <a:p>
+            <a:endParaRPr lang="en-US" dirty="0" smtClean="0"/>
+          </a:p>
+          <a:p>
+            <a:r>
+              <a:rPr lang="en-US" dirty="0" smtClean="0"/>
+              <a:t>Show</a:t>
+            </a:r>
+            <a:r>
+              <a:rPr lang="en-US" baseline="0" dirty="0" smtClean="0"/>
+              <a:t> some of the different layouts and demo one of them</a:t>
+            </a:r>
+            <a:endParaRPr lang="en-US" dirty="0"/>
+          </a:p>
+        </p:txBody>
+      </p:sp>
+      <p:sp>
+        <p:nvSpPr>
+          <p:cNvPr id="4" name="Slide Number Placeholder 3"/>
+          <p:cNvSpPr>
+            <a:spLocks noGrp="1"/>
+          </p:cNvSpPr>
+          <p:nvPr>
+            <p:ph type="sldNum" sz="quarter" idx="10"/>
+          </p:nvPr>
+        </p:nvSpPr>
+        <p:spPr/>
+        <p:txBody>
+          <a:bodyPr/>
+          <a:lstStyle/>
+          <a:p>
+            <a:fld id="{2CA6A022-9899-462F-AF11-091E7F58E280}" type="slidenum">
+              <a:rPr lang="en-US" smtClean="0"/>
+              <a:t>15</a:t>
+            </a:fld>
+            <a:endParaRPr lang="en-US"/>
+          </a:p>
+        </p:txBody>
+      </p:sp>
+    </p:spTree>
+    <p:extLst>
+      <p:ext uri="{BB962C8B-B14F-4D97-AF65-F5344CB8AC3E}">
+        <p14:creationId xmlns:p14="http://schemas.microsoft.com/office/powerpoint/2010/main" val="2892448011"/>
+      </p:ext>
+    </p:extLst>
+  </p:cSld>
+  <p:clrMapOvr>
+    <a:masterClrMapping/>
+  </p:clrMapOvr>
+</p:notes>
+</file>
+
+<file path=ppt/notesSlides/notesSlide14.xml><?xml version="1.0" encoding="utf-8"?>
+<p:notes xmlns:a="http://schemas.openxmlformats.org/drawingml/2006/main" xmlns:r="http://schemas.openxmlformats.org/officeDocument/2006/relationships" xmlns:p="http://schemas.openxmlformats.org/presentationml/2006/main">
+  <p:cSld>
+    <p:spTree>
+      <p:nvGrpSpPr>
+        <p:cNvPr id="1" name=""/>
+        <p:cNvGrpSpPr/>
+        <p:nvPr/>
+      </p:nvGrpSpPr>
+      <p:grpSpPr>
+        <a:xfrm>
+          <a:off x="0" y="0"/>
+          <a:ext cx="0" cy="0"/>
+          <a:chOff x="0" y="0"/>
+          <a:chExt cx="0" cy="0"/>
+        </a:xfrm>
+      </p:grpSpPr>
+      <p:sp>
+        <p:nvSpPr>
+          <p:cNvPr id="2" name="Slide Image Placeholder 1"/>
+          <p:cNvSpPr>
+            <a:spLocks noGrp="1" noRot="1" noChangeAspect="1"/>
+          </p:cNvSpPr>
+          <p:nvPr>
+            <p:ph type="sldImg"/>
+          </p:nvPr>
+        </p:nvSpPr>
+        <p:spPr/>
+      </p:sp>
+      <p:sp>
+        <p:nvSpPr>
+          <p:cNvPr id="3" name="Notes Placeholder 2"/>
+          <p:cNvSpPr>
+            <a:spLocks noGrp="1"/>
+          </p:cNvSpPr>
+          <p:nvPr>
+            <p:ph type="body" idx="1"/>
+          </p:nvPr>
+        </p:nvSpPr>
+        <p:spPr/>
+        <p:txBody>
+          <a:bodyPr/>
+          <a:lstStyle/>
+          <a:p>
+            <a:r>
+              <a:rPr lang="en-US" dirty="0" smtClean="0"/>
+              <a:t>Save the SVG</a:t>
+            </a:r>
+          </a:p>
+          <a:p>
+            <a:endParaRPr lang="en-US" dirty="0" smtClean="0"/>
+          </a:p>
+          <a:p>
+            <a:endParaRPr lang="en-US" dirty="0"/>
+          </a:p>
+        </p:txBody>
+      </p:sp>
+      <p:sp>
+        <p:nvSpPr>
+          <p:cNvPr id="4" name="Slide Number Placeholder 3"/>
+          <p:cNvSpPr>
+            <a:spLocks noGrp="1"/>
+          </p:cNvSpPr>
+          <p:nvPr>
+            <p:ph type="sldNum" sz="quarter" idx="10"/>
+          </p:nvPr>
+        </p:nvSpPr>
+        <p:spPr/>
+        <p:txBody>
+          <a:bodyPr/>
+          <a:lstStyle/>
+          <a:p>
+            <a:fld id="{2CA6A022-9899-462F-AF11-091E7F58E280}" type="slidenum">
+              <a:rPr lang="en-US" smtClean="0"/>
+              <a:t>16</a:t>
+            </a:fld>
+            <a:endParaRPr lang="en-US"/>
+          </a:p>
+        </p:txBody>
+      </p:sp>
+    </p:spTree>
+    <p:extLst>
+      <p:ext uri="{BB962C8B-B14F-4D97-AF65-F5344CB8AC3E}">
+        <p14:creationId xmlns:p14="http://schemas.microsoft.com/office/powerpoint/2010/main" val="1784429299"/>
+      </p:ext>
+    </p:extLst>
+  </p:cSld>
+  <p:clrMapOvr>
+    <a:masterClrMapping/>
+  </p:clrMapOvr>
+</p:notes>
+</file>
+
+<file path=ppt/notesSlides/notesSlide15.xml><?xml version="1.0" encoding="utf-8"?>
+<p:notes xmlns:a="http://schemas.openxmlformats.org/drawingml/2006/main" xmlns:r="http://schemas.openxmlformats.org/officeDocument/2006/relationships" xmlns:p="http://schemas.openxmlformats.org/presentationml/2006/main">
+  <p:cSld>
+    <p:spTree>
+      <p:nvGrpSpPr>
+        <p:cNvPr id="1" name=""/>
+        <p:cNvGrpSpPr/>
+        <p:nvPr/>
+      </p:nvGrpSpPr>
+      <p:grpSpPr>
+        <a:xfrm>
+          <a:off x="0" y="0"/>
+          <a:ext cx="0" cy="0"/>
+          <a:chOff x="0" y="0"/>
+          <a:chExt cx="0" cy="0"/>
+        </a:xfrm>
+      </p:grpSpPr>
+      <p:sp>
+        <p:nvSpPr>
+          <p:cNvPr id="2" name="Slide Image Placeholder 1"/>
+          <p:cNvSpPr>
+            <a:spLocks noGrp="1" noRot="1" noChangeAspect="1"/>
+          </p:cNvSpPr>
+          <p:nvPr>
+            <p:ph type="sldImg"/>
+          </p:nvPr>
+        </p:nvSpPr>
+        <p:spPr/>
+      </p:sp>
+      <p:sp>
+        <p:nvSpPr>
+          <p:cNvPr id="3" name="Notes Placeholder 2"/>
+          <p:cNvSpPr>
+            <a:spLocks noGrp="1"/>
+          </p:cNvSpPr>
+          <p:nvPr>
+            <p:ph type="body" idx="1"/>
+          </p:nvPr>
+        </p:nvSpPr>
+        <p:spPr/>
+        <p:txBody>
+          <a:bodyPr/>
+          <a:lstStyle/>
+          <a:p>
+            <a:endParaRPr lang="en-US" dirty="0"/>
+          </a:p>
+        </p:txBody>
+      </p:sp>
+      <p:sp>
+        <p:nvSpPr>
+          <p:cNvPr id="4" name="Slide Number Placeholder 3"/>
+          <p:cNvSpPr>
+            <a:spLocks noGrp="1"/>
+          </p:cNvSpPr>
+          <p:nvPr>
+            <p:ph type="sldNum" sz="quarter" idx="10"/>
+          </p:nvPr>
+        </p:nvSpPr>
+        <p:spPr/>
+        <p:txBody>
+          <a:bodyPr/>
+          <a:lstStyle/>
+          <a:p>
+            <a:fld id="{2CA6A022-9899-462F-AF11-091E7F58E280}" type="slidenum">
+              <a:rPr lang="en-US" smtClean="0"/>
+              <a:t>17</a:t>
+            </a:fld>
+            <a:endParaRPr lang="en-US"/>
+          </a:p>
+        </p:txBody>
+      </p:sp>
+    </p:spTree>
+    <p:extLst>
+      <p:ext uri="{BB962C8B-B14F-4D97-AF65-F5344CB8AC3E}">
+        <p14:creationId xmlns:p14="http://schemas.microsoft.com/office/powerpoint/2010/main" val="694072251"/>
+      </p:ext>
+    </p:extLst>
+  </p:cSld>
+  <p:clrMapOvr>
+    <a:masterClrMapping/>
+  </p:clrMapOvr>
+</p:notes>
+</file>
+
 <file path=ppt/notesSlides/notesSlide2.xml><?xml version="1.0" encoding="utf-8"?>
 <p:notes xmlns:a="http://schemas.openxmlformats.org/drawingml/2006/main" xmlns:r="http://schemas.openxmlformats.org/officeDocument/2006/relationships" xmlns:p="http://schemas.openxmlformats.org/presentationml/2006/main">
   <p:cSld>
@@ -2436,7 +2815,7 @@
           <a:p>
             <a:fld id="{67971B23-299D-4CF4-B59D-A17DAEBDFBC2}" type="datetimeFigureOut">
               <a:rPr lang="en-US" smtClean="0"/>
-              <a:t>3/22/2014</a:t>
+              <a:t>3/25/2014</a:t>
             </a:fld>
             <a:endParaRPr lang="en-US"/>
           </a:p>
@@ -2734,7 +3113,7 @@
           <a:p>
             <a:fld id="{67971B23-299D-4CF4-B59D-A17DAEBDFBC2}" type="datetimeFigureOut">
               <a:rPr lang="en-US" smtClean="0"/>
-              <a:t>3/22/2014</a:t>
+              <a:t>3/25/2014</a:t>
             </a:fld>
             <a:endParaRPr lang="en-US"/>
           </a:p>
@@ -2926,7 +3305,7 @@
           <a:p>
             <a:fld id="{67971B23-299D-4CF4-B59D-A17DAEBDFBC2}" type="datetimeFigureOut">
               <a:rPr lang="en-US" smtClean="0"/>
-              <a:t>3/22/2014</a:t>
+              <a:t>3/25/2014</a:t>
             </a:fld>
             <a:endParaRPr lang="en-US"/>
           </a:p>
@@ -3187,7 +3566,7 @@
           <a:p>
             <a:fld id="{67971B23-299D-4CF4-B59D-A17DAEBDFBC2}" type="datetimeFigureOut">
               <a:rPr lang="en-US" smtClean="0"/>
-              <a:t>3/22/2014</a:t>
+              <a:t>3/25/2014</a:t>
             </a:fld>
             <a:endParaRPr lang="en-US"/>
           </a:p>
@@ -3611,7 +3990,7 @@
           <a:p>
             <a:fld id="{67971B23-299D-4CF4-B59D-A17DAEBDFBC2}" type="datetimeFigureOut">
               <a:rPr lang="en-US" smtClean="0"/>
-              <a:t>3/22/2014</a:t>
+              <a:t>3/25/2014</a:t>
             </a:fld>
             <a:endParaRPr lang="en-US"/>
           </a:p>
@@ -4148,7 +4527,7 @@
           <a:p>
             <a:fld id="{67971B23-299D-4CF4-B59D-A17DAEBDFBC2}" type="datetimeFigureOut">
               <a:rPr lang="en-US" smtClean="0"/>
-              <a:t>3/22/2014</a:t>
+              <a:t>3/25/2014</a:t>
             </a:fld>
             <a:endParaRPr lang="en-US"/>
           </a:p>
@@ -5012,7 +5391,7 @@
           <a:p>
             <a:fld id="{67971B23-299D-4CF4-B59D-A17DAEBDFBC2}" type="datetimeFigureOut">
               <a:rPr lang="en-US" smtClean="0"/>
-              <a:t>3/22/2014</a:t>
+              <a:t>3/25/2014</a:t>
             </a:fld>
             <a:endParaRPr lang="en-US"/>
           </a:p>
@@ -5182,7 +5561,7 @@
           <a:p>
             <a:fld id="{67971B23-299D-4CF4-B59D-A17DAEBDFBC2}" type="datetimeFigureOut">
               <a:rPr lang="en-US" smtClean="0"/>
-              <a:t>3/22/2014</a:t>
+              <a:t>3/25/2014</a:t>
             </a:fld>
             <a:endParaRPr lang="en-US"/>
           </a:p>
@@ -5366,7 +5745,7 @@
           <a:p>
             <a:fld id="{67971B23-299D-4CF4-B59D-A17DAEBDFBC2}" type="datetimeFigureOut">
               <a:rPr lang="en-US" smtClean="0"/>
-              <a:t>3/22/2014</a:t>
+              <a:t>3/25/2014</a:t>
             </a:fld>
             <a:endParaRPr lang="en-US"/>
           </a:p>
@@ -5536,7 +5915,7 @@
           <a:p>
             <a:fld id="{67971B23-299D-4CF4-B59D-A17DAEBDFBC2}" type="datetimeFigureOut">
               <a:rPr lang="en-US" smtClean="0"/>
-              <a:t>3/22/2014</a:t>
+              <a:t>3/25/2014</a:t>
             </a:fld>
             <a:endParaRPr lang="en-US"/>
           </a:p>
@@ -5780,7 +6159,7 @@
           <a:p>
             <a:fld id="{67971B23-299D-4CF4-B59D-A17DAEBDFBC2}" type="datetimeFigureOut">
               <a:rPr lang="en-US" smtClean="0"/>
-              <a:t>3/22/2014</a:t>
+              <a:t>3/25/2014</a:t>
             </a:fld>
             <a:endParaRPr lang="en-US"/>
           </a:p>
@@ -6016,7 +6395,7 @@
           <a:p>
             <a:fld id="{67971B23-299D-4CF4-B59D-A17DAEBDFBC2}" type="datetimeFigureOut">
               <a:rPr lang="en-US" smtClean="0"/>
-              <a:t>3/22/2014</a:t>
+              <a:t>3/25/2014</a:t>
             </a:fld>
             <a:endParaRPr lang="en-US"/>
           </a:p>
@@ -6482,7 +6861,7 @@
           <a:p>
             <a:fld id="{67971B23-299D-4CF4-B59D-A17DAEBDFBC2}" type="datetimeFigureOut">
               <a:rPr lang="en-US" smtClean="0"/>
-              <a:t>3/22/2014</a:t>
+              <a:t>3/25/2014</a:t>
             </a:fld>
             <a:endParaRPr lang="en-US"/>
           </a:p>
@@ -6600,7 +6979,7 @@
           <a:p>
             <a:fld id="{67971B23-299D-4CF4-B59D-A17DAEBDFBC2}" type="datetimeFigureOut">
               <a:rPr lang="en-US" smtClean="0"/>
-              <a:t>3/22/2014</a:t>
+              <a:t>3/25/2014</a:t>
             </a:fld>
             <a:endParaRPr lang="en-US"/>
           </a:p>
@@ -6695,7 +7074,7 @@
           <a:p>
             <a:fld id="{67971B23-299D-4CF4-B59D-A17DAEBDFBC2}" type="datetimeFigureOut">
               <a:rPr lang="en-US" smtClean="0"/>
-              <a:t>3/22/2014</a:t>
+              <a:t>3/25/2014</a:t>
             </a:fld>
             <a:endParaRPr lang="en-US"/>
           </a:p>
@@ -6950,7 +7329,7 @@
           <a:p>
             <a:fld id="{67971B23-299D-4CF4-B59D-A17DAEBDFBC2}" type="datetimeFigureOut">
               <a:rPr lang="en-US" smtClean="0"/>
-              <a:t>3/22/2014</a:t>
+              <a:t>3/25/2014</a:t>
             </a:fld>
             <a:endParaRPr lang="en-US"/>
           </a:p>
@@ -7250,7 +7629,7 @@
           <a:p>
             <a:fld id="{67971B23-299D-4CF4-B59D-A17DAEBDFBC2}" type="datetimeFigureOut">
               <a:rPr lang="en-US" smtClean="0"/>
-              <a:t>3/22/2014</a:t>
+              <a:t>3/25/2014</a:t>
             </a:fld>
             <a:endParaRPr lang="en-US"/>
           </a:p>
@@ -7484,7 +7863,7 @@
           <a:p>
             <a:fld id="{67971B23-299D-4CF4-B59D-A17DAEBDFBC2}" type="datetimeFigureOut">
               <a:rPr lang="en-US" smtClean="0"/>
-              <a:t>3/22/2014</a:t>
+              <a:t>3/25/2014</a:t>
             </a:fld>
             <a:endParaRPr lang="en-US"/>
           </a:p>
@@ -8648,6 +9027,477 @@
 </p:sld>
 </file>
 
+<file path=ppt/slides/slide14.xml><?xml version="1.0" encoding="utf-8"?>
+<p:sld xmlns:a="http://schemas.openxmlformats.org/drawingml/2006/main" xmlns:r="http://schemas.openxmlformats.org/officeDocument/2006/relationships" xmlns:p="http://schemas.openxmlformats.org/presentationml/2006/main">
+  <p:cSld>
+    <p:spTree>
+      <p:nvGrpSpPr>
+        <p:cNvPr id="1" name=""/>
+        <p:cNvGrpSpPr/>
+        <p:nvPr/>
+      </p:nvGrpSpPr>
+      <p:grpSpPr>
+        <a:xfrm>
+          <a:off x="0" y="0"/>
+          <a:ext cx="0" cy="0"/>
+          <a:chOff x="0" y="0"/>
+          <a:chExt cx="0" cy="0"/>
+        </a:xfrm>
+      </p:grpSpPr>
+      <p:sp>
+        <p:nvSpPr>
+          <p:cNvPr id="2" name="Title 1"/>
+          <p:cNvSpPr>
+            <a:spLocks noGrp="1"/>
+          </p:cNvSpPr>
+          <p:nvPr>
+            <p:ph type="title"/>
+          </p:nvPr>
+        </p:nvSpPr>
+        <p:spPr/>
+        <p:txBody>
+          <a:bodyPr/>
+          <a:lstStyle/>
+          <a:p>
+            <a:r>
+              <a:rPr lang="en-US" dirty="0" smtClean="0"/>
+              <a:t>Updating Data</a:t>
+            </a:r>
+            <a:endParaRPr lang="en-US" dirty="0"/>
+          </a:p>
+        </p:txBody>
+      </p:sp>
+      <p:sp>
+        <p:nvSpPr>
+          <p:cNvPr id="3" name="Content Placeholder 2"/>
+          <p:cNvSpPr>
+            <a:spLocks noGrp="1"/>
+          </p:cNvSpPr>
+          <p:nvPr>
+            <p:ph idx="1"/>
+          </p:nvPr>
+        </p:nvSpPr>
+        <p:spPr/>
+        <p:txBody>
+          <a:bodyPr/>
+          <a:lstStyle/>
+          <a:p>
+            <a:endParaRPr lang="en-US"/>
+          </a:p>
+        </p:txBody>
+      </p:sp>
+    </p:spTree>
+    <p:extLst>
+      <p:ext uri="{BB962C8B-B14F-4D97-AF65-F5344CB8AC3E}">
+        <p14:creationId xmlns:p14="http://schemas.microsoft.com/office/powerpoint/2010/main" val="590700555"/>
+      </p:ext>
+    </p:extLst>
+  </p:cSld>
+  <p:clrMapOvr>
+    <a:masterClrMapping/>
+  </p:clrMapOvr>
+</p:sld>
+</file>
+
+<file path=ppt/slides/slide15.xml><?xml version="1.0" encoding="utf-8"?>
+<p:sld xmlns:a="http://schemas.openxmlformats.org/drawingml/2006/main" xmlns:r="http://schemas.openxmlformats.org/officeDocument/2006/relationships" xmlns:p="http://schemas.openxmlformats.org/presentationml/2006/main">
+  <p:cSld>
+    <p:spTree>
+      <p:nvGrpSpPr>
+        <p:cNvPr id="1" name=""/>
+        <p:cNvGrpSpPr/>
+        <p:nvPr/>
+      </p:nvGrpSpPr>
+      <p:grpSpPr>
+        <a:xfrm>
+          <a:off x="0" y="0"/>
+          <a:ext cx="0" cy="0"/>
+          <a:chOff x="0" y="0"/>
+          <a:chExt cx="0" cy="0"/>
+        </a:xfrm>
+      </p:grpSpPr>
+      <p:sp>
+        <p:nvSpPr>
+          <p:cNvPr id="2" name="Title 1"/>
+          <p:cNvSpPr>
+            <a:spLocks noGrp="1"/>
+          </p:cNvSpPr>
+          <p:nvPr>
+            <p:ph type="title"/>
+          </p:nvPr>
+        </p:nvSpPr>
+        <p:spPr/>
+        <p:txBody>
+          <a:bodyPr/>
+          <a:lstStyle/>
+          <a:p>
+            <a:r>
+              <a:rPr lang="en-US" dirty="0" smtClean="0"/>
+              <a:t>Building different types of charts with Layouts</a:t>
+            </a:r>
+            <a:endParaRPr lang="en-US" dirty="0"/>
+          </a:p>
+        </p:txBody>
+      </p:sp>
+      <p:sp>
+        <p:nvSpPr>
+          <p:cNvPr id="3" name="Content Placeholder 2"/>
+          <p:cNvSpPr>
+            <a:spLocks noGrp="1"/>
+          </p:cNvSpPr>
+          <p:nvPr>
+            <p:ph idx="1"/>
+          </p:nvPr>
+        </p:nvSpPr>
+        <p:spPr/>
+        <p:txBody>
+          <a:bodyPr/>
+          <a:lstStyle/>
+          <a:p>
+            <a:endParaRPr lang="en-US"/>
+          </a:p>
+        </p:txBody>
+      </p:sp>
+    </p:spTree>
+    <p:extLst>
+      <p:ext uri="{BB962C8B-B14F-4D97-AF65-F5344CB8AC3E}">
+        <p14:creationId xmlns:p14="http://schemas.microsoft.com/office/powerpoint/2010/main" val="3508602416"/>
+      </p:ext>
+    </p:extLst>
+  </p:cSld>
+  <p:clrMapOvr>
+    <a:masterClrMapping/>
+  </p:clrMapOvr>
+</p:sld>
+</file>
+
+<file path=ppt/slides/slide16.xml><?xml version="1.0" encoding="utf-8"?>
+<p:sld xmlns:a="http://schemas.openxmlformats.org/drawingml/2006/main" xmlns:r="http://schemas.openxmlformats.org/officeDocument/2006/relationships" xmlns:p="http://schemas.openxmlformats.org/presentationml/2006/main">
+  <p:cSld>
+    <p:spTree>
+      <p:nvGrpSpPr>
+        <p:cNvPr id="1" name=""/>
+        <p:cNvGrpSpPr/>
+        <p:nvPr/>
+      </p:nvGrpSpPr>
+      <p:grpSpPr>
+        <a:xfrm>
+          <a:off x="0" y="0"/>
+          <a:ext cx="0" cy="0"/>
+          <a:chOff x="0" y="0"/>
+          <a:chExt cx="0" cy="0"/>
+        </a:xfrm>
+      </p:grpSpPr>
+      <p:sp>
+        <p:nvSpPr>
+          <p:cNvPr id="2" name="Title 1"/>
+          <p:cNvSpPr>
+            <a:spLocks noGrp="1"/>
+          </p:cNvSpPr>
+          <p:nvPr>
+            <p:ph type="title"/>
+          </p:nvPr>
+        </p:nvSpPr>
+        <p:spPr/>
+        <p:txBody>
+          <a:bodyPr/>
+          <a:lstStyle/>
+          <a:p>
+            <a:r>
+              <a:rPr lang="en-US" dirty="0" smtClean="0"/>
+              <a:t>Exporting Data</a:t>
+            </a:r>
+            <a:endParaRPr lang="en-US" dirty="0"/>
+          </a:p>
+        </p:txBody>
+      </p:sp>
+      <p:sp>
+        <p:nvSpPr>
+          <p:cNvPr id="3" name="Content Placeholder 2"/>
+          <p:cNvSpPr>
+            <a:spLocks noGrp="1"/>
+          </p:cNvSpPr>
+          <p:nvPr>
+            <p:ph idx="1"/>
+          </p:nvPr>
+        </p:nvSpPr>
+        <p:spPr/>
+        <p:txBody>
+          <a:bodyPr/>
+          <a:lstStyle/>
+          <a:p>
+            <a:endParaRPr lang="en-US"/>
+          </a:p>
+        </p:txBody>
+      </p:sp>
+    </p:spTree>
+    <p:extLst>
+      <p:ext uri="{BB962C8B-B14F-4D97-AF65-F5344CB8AC3E}">
+        <p14:creationId xmlns:p14="http://schemas.microsoft.com/office/powerpoint/2010/main" val="1338051610"/>
+      </p:ext>
+    </p:extLst>
+  </p:cSld>
+  <p:clrMapOvr>
+    <a:masterClrMapping/>
+  </p:clrMapOvr>
+</p:sld>
+</file>
+
+<file path=ppt/slides/slide17.xml><?xml version="1.0" encoding="utf-8"?>
+<p:sld xmlns:a="http://schemas.openxmlformats.org/drawingml/2006/main" xmlns:r="http://schemas.openxmlformats.org/officeDocument/2006/relationships" xmlns:p="http://schemas.openxmlformats.org/presentationml/2006/main">
+  <p:cSld>
+    <p:spTree>
+      <p:nvGrpSpPr>
+        <p:cNvPr id="1" name=""/>
+        <p:cNvGrpSpPr/>
+        <p:nvPr/>
+      </p:nvGrpSpPr>
+      <p:grpSpPr>
+        <a:xfrm>
+          <a:off x="0" y="0"/>
+          <a:ext cx="0" cy="0"/>
+          <a:chOff x="0" y="0"/>
+          <a:chExt cx="0" cy="0"/>
+        </a:xfrm>
+      </p:grpSpPr>
+      <p:sp>
+        <p:nvSpPr>
+          <p:cNvPr id="2" name="Title 1"/>
+          <p:cNvSpPr>
+            <a:spLocks noGrp="1"/>
+          </p:cNvSpPr>
+          <p:nvPr>
+            <p:ph type="title"/>
+          </p:nvPr>
+        </p:nvSpPr>
+        <p:spPr/>
+        <p:txBody>
+          <a:bodyPr>
+            <a:normAutofit/>
+          </a:bodyPr>
+          <a:lstStyle/>
+          <a:p>
+            <a:r>
+              <a:rPr lang="en-US" dirty="0" smtClean="0"/>
+              <a:t>Resources</a:t>
+            </a:r>
+            <a:endParaRPr lang="en-US" dirty="0"/>
+          </a:p>
+        </p:txBody>
+      </p:sp>
+      <p:sp>
+        <p:nvSpPr>
+          <p:cNvPr id="3" name="Content Placeholder 2"/>
+          <p:cNvSpPr>
+            <a:spLocks noGrp="1"/>
+          </p:cNvSpPr>
+          <p:nvPr>
+            <p:ph idx="1"/>
+          </p:nvPr>
+        </p:nvSpPr>
+        <p:spPr>
+          <a:xfrm>
+            <a:off x="983975" y="1732449"/>
+            <a:ext cx="10366512" cy="4867134"/>
+          </a:xfrm>
+        </p:spPr>
+        <p:txBody>
+          <a:bodyPr>
+            <a:normAutofit lnSpcReduction="10000"/>
+          </a:bodyPr>
+          <a:lstStyle/>
+          <a:p>
+            <a:pPr marL="36900" indent="0">
+              <a:buNone/>
+            </a:pPr>
+            <a:r>
+              <a:rPr lang="en-US" dirty="0" smtClean="0"/>
+              <a:t>Info About D3.js: </a:t>
+            </a:r>
+          </a:p>
+          <a:p>
+            <a:pPr marL="36900" indent="0">
+              <a:buNone/>
+            </a:pPr>
+            <a:r>
+              <a:rPr lang="en-US" dirty="0">
+                <a:hlinkClick r:id="rId3"/>
+              </a:rPr>
+              <a:t>http://d3js.org</a:t>
+            </a:r>
+            <a:r>
+              <a:rPr lang="en-US" dirty="0" smtClean="0">
+                <a:hlinkClick r:id="rId3"/>
+              </a:rPr>
+              <a:t>/</a:t>
+            </a:r>
+            <a:endParaRPr lang="en-US" dirty="0" smtClean="0"/>
+          </a:p>
+          <a:p>
+            <a:pPr marL="36900" indent="0">
+              <a:buNone/>
+            </a:pPr>
+            <a:r>
+              <a:rPr lang="en-US" dirty="0">
+                <a:hlinkClick r:id="rId4"/>
+              </a:rPr>
+              <a:t>http://bost.ocks.org/mike</a:t>
+            </a:r>
+            <a:r>
+              <a:rPr lang="en-US" dirty="0" smtClean="0">
+                <a:hlinkClick r:id="rId4"/>
+              </a:rPr>
+              <a:t>/</a:t>
+            </a:r>
+            <a:endParaRPr lang="en-US" dirty="0" smtClean="0"/>
+          </a:p>
+          <a:p>
+            <a:pPr marL="36900" indent="0">
+              <a:buNone/>
+            </a:pPr>
+            <a:r>
+              <a:rPr lang="en-US" dirty="0">
+                <a:hlinkClick r:id="rId5"/>
+              </a:rPr>
+              <a:t>Interactive Data Visualization for the Web</a:t>
+            </a:r>
+            <a:endParaRPr lang="en-US" dirty="0"/>
+          </a:p>
+          <a:p>
+            <a:pPr marL="36900" indent="0">
+              <a:buNone/>
+            </a:pPr>
+            <a:r>
+              <a:rPr lang="en-US" dirty="0">
+                <a:hlinkClick r:id="rId6"/>
+              </a:rPr>
+              <a:t>http://alignedleft.com/tutorials/d3</a:t>
+            </a:r>
+            <a:r>
+              <a:rPr lang="en-US" dirty="0" smtClean="0">
+                <a:hlinkClick r:id="rId6"/>
+              </a:rPr>
+              <a:t>/</a:t>
+            </a:r>
+            <a:endParaRPr lang="en-US" dirty="0" smtClean="0"/>
+          </a:p>
+          <a:p>
+            <a:pPr marL="36900" indent="0">
+              <a:buNone/>
+            </a:pPr>
+            <a:endParaRPr lang="en-US" dirty="0" smtClean="0"/>
+          </a:p>
+          <a:p>
+            <a:pPr marL="36900" indent="0">
+              <a:buNone/>
+            </a:pPr>
+            <a:r>
+              <a:rPr lang="en-US" dirty="0" smtClean="0"/>
+              <a:t>Datasets: </a:t>
+            </a:r>
+          </a:p>
+          <a:p>
+            <a:pPr marL="36900" indent="0">
+              <a:buNone/>
+            </a:pPr>
+            <a:r>
+              <a:rPr lang="en-US" dirty="0">
+                <a:effectLst/>
+                <a:hlinkClick r:id="rId7"/>
+              </a:rPr>
+              <a:t>http://www.gapminder.org/data</a:t>
+            </a:r>
+            <a:r>
+              <a:rPr lang="en-US" dirty="0" smtClean="0">
+                <a:effectLst/>
+                <a:hlinkClick r:id="rId7"/>
+              </a:rPr>
+              <a:t>/</a:t>
+            </a:r>
+            <a:endParaRPr lang="en-US" dirty="0"/>
+          </a:p>
+          <a:p>
+            <a:pPr marL="36900" indent="0">
+              <a:buNone/>
+            </a:pPr>
+            <a:r>
+              <a:rPr lang="en-US" dirty="0">
+                <a:hlinkClick r:id="rId8"/>
+              </a:rPr>
+              <a:t>http://www.data.gov</a:t>
+            </a:r>
+            <a:r>
+              <a:rPr lang="en-US" dirty="0" smtClean="0">
+                <a:hlinkClick r:id="rId8"/>
+              </a:rPr>
+              <a:t>/</a:t>
+            </a:r>
+            <a:endParaRPr lang="en-US" dirty="0" smtClean="0"/>
+          </a:p>
+          <a:p>
+            <a:pPr marL="36900" indent="0">
+              <a:buNone/>
+            </a:pPr>
+            <a:r>
+              <a:rPr lang="en-US" dirty="0">
+                <a:effectLst/>
+                <a:hlinkClick r:id="rId9"/>
+              </a:rPr>
+              <a:t>http://www.bls.gov/</a:t>
+            </a:r>
+            <a:endParaRPr lang="en-US" dirty="0">
+              <a:effectLst/>
+            </a:endParaRPr>
+          </a:p>
+          <a:p>
+            <a:pPr marL="36900" indent="0">
+              <a:buNone/>
+            </a:pPr>
+            <a:r>
+              <a:rPr lang="en-US" dirty="0" smtClean="0">
+                <a:effectLst/>
+                <a:hlinkClick r:id="rId10"/>
+              </a:rPr>
+              <a:t>https</a:t>
+            </a:r>
+            <a:r>
+              <a:rPr lang="en-US" dirty="0">
+                <a:effectLst/>
+                <a:hlinkClick r:id="rId10"/>
+              </a:rPr>
+              <a:t>://data.cityofmadison.com/</a:t>
+            </a:r>
+            <a:endParaRPr lang="en-US" dirty="0">
+              <a:effectLst/>
+            </a:endParaRPr>
+          </a:p>
+          <a:p>
+            <a:pPr marL="36900" indent="0">
+              <a:buNone/>
+            </a:pPr>
+            <a:endParaRPr lang="en-US" dirty="0"/>
+          </a:p>
+          <a:p>
+            <a:pPr marL="36900" indent="0">
+              <a:buNone/>
+            </a:pPr>
+            <a:endParaRPr lang="en-US" dirty="0"/>
+          </a:p>
+        </p:txBody>
+      </p:sp>
+    </p:spTree>
+    <p:extLst>
+      <p:ext uri="{BB962C8B-B14F-4D97-AF65-F5344CB8AC3E}">
+        <p14:creationId xmlns:p14="http://schemas.microsoft.com/office/powerpoint/2010/main" val="297674098"/>
+      </p:ext>
+    </p:extLst>
+  </p:cSld>
+  <p:clrMapOvr>
+    <a:masterClrMapping/>
+  </p:clrMapOvr>
+</p:sld>
+</file>
+
 <file path=ppt/slides/slide2.xml><?xml version="1.0" encoding="utf-8"?>
 <p:sld xmlns:a="http://schemas.openxmlformats.org/drawingml/2006/main" xmlns:r="http://schemas.openxmlformats.org/officeDocument/2006/relationships" xmlns:p="http://schemas.openxmlformats.org/presentationml/2006/main">
   <p:cSld>

</xml_diff>

<commit_message>
Made some changes to improve formatting
</commit_message>
<xml_diff>
--- a/Slides/D3.pptx
+++ b/Slides/D3.pptx
@@ -211,7 +211,7 @@
           <a:p>
             <a:fld id="{F2FD5E34-5871-4249-913E-D69CD2F5B120}" type="datetimeFigureOut">
               <a:rPr lang="en-US" smtClean="0"/>
-              <a:t>3/31/2014</a:t>
+              <a:t>4/2/2014</a:t>
             </a:fld>
             <a:endParaRPr lang="en-US"/>
           </a:p>
@@ -1373,15 +1373,7 @@
             </a:pPr>
             <a:r>
               <a:rPr lang="en-US" baseline="0" dirty="0" smtClean="0"/>
-              <a:t>Increased </a:t>
-            </a:r>
-            <a:r>
-              <a:rPr lang="en-US" baseline="0" dirty="0" smtClean="0"/>
-              <a:t>conceptualization of large </a:t>
-            </a:r>
-            <a:r>
-              <a:rPr lang="en-US" baseline="0" dirty="0" smtClean="0"/>
-              <a:t>numbers</a:t>
+              <a:t>Increased conceptualization of large numbers</a:t>
             </a:r>
           </a:p>
           <a:p>
@@ -1407,7 +1399,6 @@
               <a:rPr lang="en-US" baseline="0" dirty="0" smtClean="0"/>
               <a:t>Examples: </a:t>
             </a:r>
-            <a:endParaRPr lang="en-US" baseline="0" dirty="0" smtClean="0"/>
           </a:p>
           <a:p>
             <a:pPr marL="685800" lvl="1" indent="-228600">
@@ -1443,19 +1434,7 @@
               <a:rPr lang="en-US" dirty="0" smtClean="0">
                 <a:hlinkClick r:id="rId3"/>
               </a:rPr>
-              <a:t>http</a:t>
-            </a:r>
-            <a:r>
-              <a:rPr lang="en-US" dirty="0" smtClean="0">
-                <a:hlinkClick r:id="rId3"/>
-              </a:rPr>
-              <a:t>://</a:t>
-            </a:r>
-            <a:r>
-              <a:rPr lang="en-US" dirty="0" smtClean="0">
-                <a:hlinkClick r:id="rId3"/>
-              </a:rPr>
-              <a:t>xkcd.com/980/huge</a:t>
+              <a:t>http://xkcd.com/980/huge</a:t>
             </a:r>
             <a:endParaRPr lang="en-US" dirty="0" smtClean="0"/>
           </a:p>
@@ -2619,11 +2598,7 @@
           <a:p>
             <a:r>
               <a:rPr lang="en-US" dirty="0" smtClean="0"/>
-              <a:t>D3 </a:t>
-            </a:r>
-            <a:r>
-              <a:rPr lang="en-US" dirty="0" smtClean="0"/>
-              <a:t>excels at creating interactive web visualizations in SVG</a:t>
+              <a:t>D3 excels at creating interactive web visualizations in SVG</a:t>
             </a:r>
             <a:endParaRPr lang="en-US" baseline="0" dirty="0" smtClean="0"/>
           </a:p>
@@ -2633,30 +2608,17 @@
           <a:p>
             <a:r>
               <a:rPr lang="en-US" baseline="0" dirty="0" smtClean="0"/>
-              <a:t>Includes tools for creating lots of common data </a:t>
-            </a:r>
+              <a:t>Includes tools for creating lots of common data visualizations, including Geo Maps</a:t>
+            </a:r>
+          </a:p>
+          <a:p>
+            <a:endParaRPr lang="en-US" baseline="0" dirty="0" smtClean="0"/>
+          </a:p>
+          <a:p>
             <a:r>
               <a:rPr lang="en-US" baseline="0" dirty="0" smtClean="0"/>
-              <a:t>visualizations, </a:t>
-            </a:r>
-            <a:r>
-              <a:rPr lang="en-US" baseline="0" dirty="0" smtClean="0"/>
-              <a:t>including Geo Maps</a:t>
-            </a:r>
-          </a:p>
-          <a:p>
-            <a:endParaRPr lang="en-US" baseline="0" dirty="0" smtClean="0"/>
-          </a:p>
-          <a:p>
-            <a:r>
-              <a:rPr lang="en-US" baseline="0" dirty="0" smtClean="0"/>
-              <a:t>There’s no </a:t>
-            </a:r>
-            <a:r>
-              <a:rPr lang="en-US" baseline="0" dirty="0" smtClean="0"/>
-              <a:t>plugins</a:t>
-            </a:r>
-            <a:endParaRPr lang="en-US" baseline="0" dirty="0" smtClean="0"/>
+              <a:t>There’s no plugins</a:t>
+            </a:r>
           </a:p>
           <a:p>
             <a:endParaRPr lang="en-US" baseline="0" dirty="0" smtClean="0"/>
@@ -2799,11 +2761,7 @@
           <a:p>
             <a:r>
               <a:rPr lang="en-US" dirty="0" smtClean="0"/>
-              <a:t>Doesn’t </a:t>
-            </a:r>
-            <a:r>
-              <a:rPr lang="en-US" dirty="0" smtClean="0"/>
-              <a:t>include</a:t>
+              <a:t>Doesn’t include</a:t>
             </a:r>
             <a:r>
               <a:rPr lang="en-US" baseline="0" dirty="0" smtClean="0"/>
@@ -3067,7 +3025,7 @@
           <a:p>
             <a:fld id="{67971B23-299D-4CF4-B59D-A17DAEBDFBC2}" type="datetimeFigureOut">
               <a:rPr lang="en-US" smtClean="0"/>
-              <a:t>3/31/2014</a:t>
+              <a:t>4/2/2014</a:t>
             </a:fld>
             <a:endParaRPr lang="en-US"/>
           </a:p>
@@ -3365,7 +3323,7 @@
           <a:p>
             <a:fld id="{67971B23-299D-4CF4-B59D-A17DAEBDFBC2}" type="datetimeFigureOut">
               <a:rPr lang="en-US" smtClean="0"/>
-              <a:t>3/31/2014</a:t>
+              <a:t>4/2/2014</a:t>
             </a:fld>
             <a:endParaRPr lang="en-US"/>
           </a:p>
@@ -3557,7 +3515,7 @@
           <a:p>
             <a:fld id="{67971B23-299D-4CF4-B59D-A17DAEBDFBC2}" type="datetimeFigureOut">
               <a:rPr lang="en-US" smtClean="0"/>
-              <a:t>3/31/2014</a:t>
+              <a:t>4/2/2014</a:t>
             </a:fld>
             <a:endParaRPr lang="en-US"/>
           </a:p>
@@ -3818,7 +3776,7 @@
           <a:p>
             <a:fld id="{67971B23-299D-4CF4-B59D-A17DAEBDFBC2}" type="datetimeFigureOut">
               <a:rPr lang="en-US" smtClean="0"/>
-              <a:t>3/31/2014</a:t>
+              <a:t>4/2/2014</a:t>
             </a:fld>
             <a:endParaRPr lang="en-US"/>
           </a:p>
@@ -4242,7 +4200,7 @@
           <a:p>
             <a:fld id="{67971B23-299D-4CF4-B59D-A17DAEBDFBC2}" type="datetimeFigureOut">
               <a:rPr lang="en-US" smtClean="0"/>
-              <a:t>3/31/2014</a:t>
+              <a:t>4/2/2014</a:t>
             </a:fld>
             <a:endParaRPr lang="en-US"/>
           </a:p>
@@ -4779,7 +4737,7 @@
           <a:p>
             <a:fld id="{67971B23-299D-4CF4-B59D-A17DAEBDFBC2}" type="datetimeFigureOut">
               <a:rPr lang="en-US" smtClean="0"/>
-              <a:t>3/31/2014</a:t>
+              <a:t>4/2/2014</a:t>
             </a:fld>
             <a:endParaRPr lang="en-US"/>
           </a:p>
@@ -5643,7 +5601,7 @@
           <a:p>
             <a:fld id="{67971B23-299D-4CF4-B59D-A17DAEBDFBC2}" type="datetimeFigureOut">
               <a:rPr lang="en-US" smtClean="0"/>
-              <a:t>3/31/2014</a:t>
+              <a:t>4/2/2014</a:t>
             </a:fld>
             <a:endParaRPr lang="en-US"/>
           </a:p>
@@ -5813,7 +5771,7 @@
           <a:p>
             <a:fld id="{67971B23-299D-4CF4-B59D-A17DAEBDFBC2}" type="datetimeFigureOut">
               <a:rPr lang="en-US" smtClean="0"/>
-              <a:t>3/31/2014</a:t>
+              <a:t>4/2/2014</a:t>
             </a:fld>
             <a:endParaRPr lang="en-US"/>
           </a:p>
@@ -5997,7 +5955,7 @@
           <a:p>
             <a:fld id="{67971B23-299D-4CF4-B59D-A17DAEBDFBC2}" type="datetimeFigureOut">
               <a:rPr lang="en-US" smtClean="0"/>
-              <a:t>3/31/2014</a:t>
+              <a:t>4/2/2014</a:t>
             </a:fld>
             <a:endParaRPr lang="en-US"/>
           </a:p>
@@ -6167,7 +6125,7 @@
           <a:p>
             <a:fld id="{67971B23-299D-4CF4-B59D-A17DAEBDFBC2}" type="datetimeFigureOut">
               <a:rPr lang="en-US" smtClean="0"/>
-              <a:t>3/31/2014</a:t>
+              <a:t>4/2/2014</a:t>
             </a:fld>
             <a:endParaRPr lang="en-US"/>
           </a:p>
@@ -6411,7 +6369,7 @@
           <a:p>
             <a:fld id="{67971B23-299D-4CF4-B59D-A17DAEBDFBC2}" type="datetimeFigureOut">
               <a:rPr lang="en-US" smtClean="0"/>
-              <a:t>3/31/2014</a:t>
+              <a:t>4/2/2014</a:t>
             </a:fld>
             <a:endParaRPr lang="en-US"/>
           </a:p>
@@ -6647,7 +6605,7 @@
           <a:p>
             <a:fld id="{67971B23-299D-4CF4-B59D-A17DAEBDFBC2}" type="datetimeFigureOut">
               <a:rPr lang="en-US" smtClean="0"/>
-              <a:t>3/31/2014</a:t>
+              <a:t>4/2/2014</a:t>
             </a:fld>
             <a:endParaRPr lang="en-US"/>
           </a:p>
@@ -7113,7 +7071,7 @@
           <a:p>
             <a:fld id="{67971B23-299D-4CF4-B59D-A17DAEBDFBC2}" type="datetimeFigureOut">
               <a:rPr lang="en-US" smtClean="0"/>
-              <a:t>3/31/2014</a:t>
+              <a:t>4/2/2014</a:t>
             </a:fld>
             <a:endParaRPr lang="en-US"/>
           </a:p>
@@ -7231,7 +7189,7 @@
           <a:p>
             <a:fld id="{67971B23-299D-4CF4-B59D-A17DAEBDFBC2}" type="datetimeFigureOut">
               <a:rPr lang="en-US" smtClean="0"/>
-              <a:t>3/31/2014</a:t>
+              <a:t>4/2/2014</a:t>
             </a:fld>
             <a:endParaRPr lang="en-US"/>
           </a:p>
@@ -7326,7 +7284,7 @@
           <a:p>
             <a:fld id="{67971B23-299D-4CF4-B59D-A17DAEBDFBC2}" type="datetimeFigureOut">
               <a:rPr lang="en-US" smtClean="0"/>
-              <a:t>3/31/2014</a:t>
+              <a:t>4/2/2014</a:t>
             </a:fld>
             <a:endParaRPr lang="en-US"/>
           </a:p>
@@ -7581,7 +7539,7 @@
           <a:p>
             <a:fld id="{67971B23-299D-4CF4-B59D-A17DAEBDFBC2}" type="datetimeFigureOut">
               <a:rPr lang="en-US" smtClean="0"/>
-              <a:t>3/31/2014</a:t>
+              <a:t>4/2/2014</a:t>
             </a:fld>
             <a:endParaRPr lang="en-US"/>
           </a:p>
@@ -7881,7 +7839,7 @@
           <a:p>
             <a:fld id="{67971B23-299D-4CF4-B59D-A17DAEBDFBC2}" type="datetimeFigureOut">
               <a:rPr lang="en-US" smtClean="0"/>
-              <a:t>3/31/2014</a:t>
+              <a:t>4/2/2014</a:t>
             </a:fld>
             <a:endParaRPr lang="en-US"/>
           </a:p>
@@ -8115,7 +8073,7 @@
           <a:p>
             <a:fld id="{67971B23-299D-4CF4-B59D-A17DAEBDFBC2}" type="datetimeFigureOut">
               <a:rPr lang="en-US" smtClean="0"/>
-              <a:t>3/31/2014</a:t>
+              <a:t>4/2/2014</a:t>
             </a:fld>
             <a:endParaRPr lang="en-US"/>
           </a:p>
@@ -9022,14 +8980,16 @@
         </p:nvSpPr>
         <p:spPr/>
         <p:txBody>
-          <a:bodyPr/>
-          <a:lstStyle/>
-          <a:p>
-            <a:r>
-              <a:rPr lang="en-US" dirty="0" smtClean="0"/>
+          <a:bodyPr>
+            <a:noAutofit/>
+          </a:bodyPr>
+          <a:lstStyle/>
+          <a:p>
+            <a:r>
+              <a:rPr lang="en-US" sz="6000" dirty="0" smtClean="0"/>
               <a:t>Why Not D3.js?</a:t>
             </a:r>
-            <a:endParaRPr lang="en-US" dirty="0"/>
+            <a:endParaRPr lang="en-US" sz="6000" dirty="0"/>
           </a:p>
         </p:txBody>
       </p:sp>
@@ -9082,14 +9042,16 @@
         </p:nvSpPr>
         <p:spPr/>
         <p:txBody>
-          <a:bodyPr/>
-          <a:lstStyle/>
-          <a:p>
-            <a:r>
-              <a:rPr lang="en-US" dirty="0" smtClean="0"/>
+          <a:bodyPr>
+            <a:noAutofit/>
+          </a:bodyPr>
+          <a:lstStyle/>
+          <a:p>
+            <a:r>
+              <a:rPr lang="en-US" sz="6000" dirty="0" smtClean="0"/>
               <a:t>Just Enough SVG</a:t>
             </a:r>
-            <a:endParaRPr lang="en-US" dirty="0"/>
+            <a:endParaRPr lang="en-US" sz="6000" dirty="0"/>
           </a:p>
         </p:txBody>
       </p:sp>
@@ -9161,14 +9123,16 @@
         </p:nvSpPr>
         <p:spPr/>
         <p:txBody>
-          <a:bodyPr/>
-          <a:lstStyle/>
-          <a:p>
-            <a:r>
-              <a:rPr lang="en-US" dirty="0" smtClean="0"/>
+          <a:bodyPr>
+            <a:noAutofit/>
+          </a:bodyPr>
+          <a:lstStyle/>
+          <a:p>
+            <a:r>
+              <a:rPr lang="en-US" sz="6000" dirty="0" smtClean="0"/>
               <a:t>SVG Circle</a:t>
             </a:r>
-            <a:endParaRPr lang="en-US" dirty="0"/>
+            <a:endParaRPr lang="en-US" sz="6000" dirty="0"/>
           </a:p>
         </p:txBody>
       </p:sp>
@@ -9272,14 +9236,16 @@
         </p:nvSpPr>
         <p:spPr/>
         <p:txBody>
-          <a:bodyPr/>
-          <a:lstStyle/>
-          <a:p>
-            <a:r>
-              <a:rPr lang="en-US" dirty="0" smtClean="0"/>
+          <a:bodyPr>
+            <a:noAutofit/>
+          </a:bodyPr>
+          <a:lstStyle/>
+          <a:p>
+            <a:r>
+              <a:rPr lang="en-US" sz="6000" dirty="0" smtClean="0"/>
               <a:t>SVG Rectangle</a:t>
             </a:r>
-            <a:endParaRPr lang="en-US" dirty="0"/>
+            <a:endParaRPr lang="en-US" sz="6000" dirty="0"/>
           </a:p>
         </p:txBody>
       </p:sp>
@@ -9356,14 +9322,16 @@
         </p:nvSpPr>
         <p:spPr/>
         <p:txBody>
-          <a:bodyPr/>
-          <a:lstStyle/>
-          <a:p>
-            <a:r>
-              <a:rPr lang="en-US" dirty="0" smtClean="0"/>
+          <a:bodyPr>
+            <a:noAutofit/>
+          </a:bodyPr>
+          <a:lstStyle/>
+          <a:p>
+            <a:r>
+              <a:rPr lang="en-US" sz="6000" dirty="0" smtClean="0"/>
               <a:t>Demo Time!</a:t>
             </a:r>
-            <a:endParaRPr lang="en-US" dirty="0"/>
+            <a:endParaRPr lang="en-US" sz="6000" dirty="0"/>
           </a:p>
         </p:txBody>
       </p:sp>
@@ -10626,33 +10594,35 @@
         </p:nvSpPr>
         <p:spPr/>
         <p:txBody>
+          <a:bodyPr>
+            <a:noAutofit/>
+          </a:bodyPr>
+          <a:lstStyle/>
+          <a:p>
+            <a:r>
+              <a:rPr lang="en-US" sz="6000" dirty="0" smtClean="0"/>
+              <a:t>Why D3.js?</a:t>
+            </a:r>
+            <a:endParaRPr lang="en-US" sz="6000" dirty="0"/>
+          </a:p>
+        </p:txBody>
+      </p:sp>
+      <p:sp>
+        <p:nvSpPr>
+          <p:cNvPr id="4" name="Content Placeholder 3"/>
+          <p:cNvSpPr>
+            <a:spLocks noGrp="1"/>
+          </p:cNvSpPr>
+          <p:nvPr>
+            <p:ph idx="1"/>
+          </p:nvPr>
+        </p:nvSpPr>
+        <p:spPr/>
+        <p:txBody>
           <a:bodyPr/>
           <a:lstStyle/>
           <a:p>
-            <a:r>
-              <a:rPr lang="en-US" dirty="0" smtClean="0"/>
-              <a:t>Why D3.js?</a:t>
-            </a:r>
             <a:endParaRPr lang="en-US" dirty="0"/>
-          </a:p>
-        </p:txBody>
-      </p:sp>
-      <p:sp>
-        <p:nvSpPr>
-          <p:cNvPr id="4" name="Content Placeholder 3"/>
-          <p:cNvSpPr>
-            <a:spLocks noGrp="1"/>
-          </p:cNvSpPr>
-          <p:nvPr>
-            <p:ph idx="1"/>
-          </p:nvPr>
-        </p:nvSpPr>
-        <p:spPr/>
-        <p:txBody>
-          <a:bodyPr/>
-          <a:lstStyle/>
-          <a:p>
-            <a:endParaRPr lang="en-US"/>
           </a:p>
         </p:txBody>
       </p:sp>

</xml_diff>